<commit_message>
presentation typo introduction slide corrected
</commit_message>
<xml_diff>
--- a/presentation/1884561_1895955_1882789_presentation.pptx
+++ b/presentation/1884561_1895955_1882789_presentation.pptx
@@ -7526,12 +7526,12 @@
               <a:t> </a:t>
             </a:r>
             <a:r>
-              <a:rPr lang="it-IT" altLang="it-IT" dirty="0" err="1"/>
-              <a:t>calssification</a:t>
+              <a:rPr lang="it-IT" altLang="it-IT"/>
+              <a:t>classification </a:t>
             </a:r>
             <a:r>
               <a:rPr lang="it-IT" altLang="it-IT" dirty="0"/>
-              <a:t> on a </a:t>
+              <a:t>on a </a:t>
             </a:r>
             <a:r>
               <a:rPr lang="it-IT" altLang="it-IT" dirty="0" err="1"/>
@@ -13583,14 +13583,14 @@
         <a:effectLst/>
         <a:extLst>
           <a:ext uri="{909E8E84-426E-40dd-AFC4-6F175D3DCCD1}">
-            <a14:hiddenFill xmlns="" xmlns:a14="http://schemas.microsoft.com/office/drawing/2010/main">
+            <a14:hiddenFill xmlns:a14="http://schemas.microsoft.com/office/drawing/2010/main" xmlns="">
               <a:solidFill>
                 <a:schemeClr val="accent1"/>
               </a:solidFill>
             </a14:hiddenFill>
           </a:ext>
           <a:ext uri="{91240B29-F687-4f45-9708-019B960494DF}">
-            <a14:hiddenLine xmlns="" xmlns:a14="http://schemas.microsoft.com/office/drawing/2010/main" w="9525" cap="flat" cmpd="sng" algn="ctr">
+            <a14:hiddenLine xmlns:a14="http://schemas.microsoft.com/office/drawing/2010/main" xmlns="" w="9525" cap="flat" cmpd="sng" algn="ctr">
               <a:solidFill>
                 <a:schemeClr val="tx1"/>
               </a:solidFill>
@@ -13601,7 +13601,7 @@
             </a14:hiddenLine>
           </a:ext>
           <a:ext uri="{AF507438-7753-43e0-B8FC-AC1667EBCBE1}">
-            <a14:hiddenEffects xmlns="" xmlns:a14="http://schemas.microsoft.com/office/drawing/2010/main">
+            <a14:hiddenEffects xmlns:a14="http://schemas.microsoft.com/office/drawing/2010/main" xmlns="">
               <a:effectLst>
                 <a:outerShdw blurRad="63500" dist="38099" dir="2700000" algn="ctr" rotWithShape="0">
                   <a:srgbClr val="000000">
@@ -13670,14 +13670,14 @@
         <a:effectLst/>
         <a:extLst>
           <a:ext uri="{909E8E84-426E-40dd-AFC4-6F175D3DCCD1}">
-            <a14:hiddenFill xmlns="" xmlns:a14="http://schemas.microsoft.com/office/drawing/2010/main">
+            <a14:hiddenFill xmlns:a14="http://schemas.microsoft.com/office/drawing/2010/main" xmlns="">
               <a:solidFill>
                 <a:schemeClr val="accent1"/>
               </a:solidFill>
             </a14:hiddenFill>
           </a:ext>
           <a:ext uri="{91240B29-F687-4f45-9708-019B960494DF}">
-            <a14:hiddenLine xmlns="" xmlns:a14="http://schemas.microsoft.com/office/drawing/2010/main" w="9525" cap="flat" cmpd="sng" algn="ctr">
+            <a14:hiddenLine xmlns:a14="http://schemas.microsoft.com/office/drawing/2010/main" xmlns="" w="9525" cap="flat" cmpd="sng" algn="ctr">
               <a:solidFill>
                 <a:schemeClr val="tx1"/>
               </a:solidFill>
@@ -13688,7 +13688,7 @@
             </a14:hiddenLine>
           </a:ext>
           <a:ext uri="{AF507438-7753-43e0-B8FC-AC1667EBCBE1}">
-            <a14:hiddenEffects xmlns="" xmlns:a14="http://schemas.microsoft.com/office/drawing/2010/main">
+            <a14:hiddenEffects xmlns:a14="http://schemas.microsoft.com/office/drawing/2010/main" xmlns="">
               <a:effectLst>
                 <a:outerShdw blurRad="63500" dist="38099" dir="2700000" algn="ctr" rotWithShape="0">
                   <a:srgbClr val="000000">

</xml_diff>